<commit_message>
Update Daniel Cardoso PSW - Guided Capstone 1 - Final Presentation - V2.pptx
Reviewed the problem statement based on mentor's feedback
</commit_message>
<xml_diff>
--- a/Daniel Cardoso PSW - Guided Capstone 1 - Final Presentation - V2.pptx
+++ b/Daniel Cardoso PSW - Guided Capstone 1 - Final Presentation - V2.pptx
@@ -6175,18 +6175,9 @@
               <a:buNone/>
             </a:pPr>
             <a:r>
-              <a:rPr lang="en-AU" sz="1070" dirty="0"/>
-              <a:t>Have a better pricing strategy during the season that capitalize on the equipment and the new investments of </a:t>
+              <a:rPr lang="en-US" sz="1070" dirty="0"/>
+              <a:t>Have a better pricing strategy during the season that capitalize on the equipment and resorts’ amenities.</a:t>
             </a:r>
-            <a:r>
-              <a:rPr lang="en-CA" sz="1070" dirty="0"/>
-              <a:t>$1,540,000 </a:t>
-            </a:r>
-            <a:r>
-              <a:rPr lang="en-AU" sz="1070" dirty="0"/>
-              <a:t>related to the addition of a new lift.</a:t>
-            </a:r>
-            <a:endParaRPr sz="1070" dirty="0"/>
           </a:p>
         </p:txBody>
       </p:sp>
@@ -6217,7 +6208,7 @@
           <a:p>
             <a:r>
               <a:rPr lang="en-CA" sz="1070" dirty="0"/>
-              <a:t>Current pricing strategy on the ticket price and/or costs to operate the resort.</a:t>
+              <a:t>Pricing strategy on the ticket price, operating costs of the resort and resorts amenities.</a:t>
             </a:r>
           </a:p>
           <a:p>
@@ -6803,14 +6794,10 @@
               <a:buSzPts val="1400"/>
             </a:pPr>
             <a:r>
-              <a:rPr lang="en-AU" b="1" dirty="0"/>
-              <a:t>How to select a better pricing strategy during this season to capitalize on the current equipment and the new lift addition of </a:t>
+              <a:rPr lang="en-US" b="1" dirty="0"/>
+              <a:t>How to select a better pricing strategy during this season to capitalize on the current equipment and amenities, increasing the ticket price based on other resorts’ amenities ?</a:t>
             </a:r>
-            <a:r>
-              <a:rPr lang="en-CA" b="1" dirty="0"/>
-              <a:t>$1,540,000, increasing the ticket price based on other resorts ?</a:t>
-            </a:r>
-            <a:endParaRPr sz="1400" b="1" i="0" u="none" strike="noStrike" cap="none" dirty="0">
+            <a:endParaRPr lang="en-US" sz="1400" b="1" i="0" u="none" strike="noStrike" cap="none" dirty="0">
               <a:solidFill>
                 <a:srgbClr val="000000"/>
               </a:solidFill>

</xml_diff>